<commit_message>
update QC session based on comments from nov20 course
</commit_message>
<xml_diff>
--- a/slide_qc.pptx
+++ b/slide_qc.pptx
@@ -14,13 +14,16 @@
     <p:sldMasterId id="2147483717" r:id="rId10"/>
   </p:sldMasterIdLst>
   <p:notesMasterIdLst>
-    <p:notesMasterId r:id="rId15"/>
+    <p:notesMasterId r:id="rId18"/>
   </p:notesMasterIdLst>
   <p:sldIdLst>
     <p:sldId id="569" r:id="rId11"/>
-    <p:sldId id="570" r:id="rId12"/>
-    <p:sldId id="571" r:id="rId13"/>
+    <p:sldId id="574" r:id="rId12"/>
+    <p:sldId id="570" r:id="rId13"/>
     <p:sldId id="572" r:id="rId14"/>
+    <p:sldId id="577" r:id="rId15"/>
+    <p:sldId id="578" r:id="rId16"/>
+    <p:sldId id="575" r:id="rId17"/>
   </p:sldIdLst>
   <p:sldSz cx="9144000" cy="6858000" type="screen4x3"/>
   <p:notesSz cx="6858000" cy="9144000"/>
@@ -220,7 +223,7 @@
           <a:p>
             <a:fld id="{37165608-A292-D74A-8B83-0E194A57CE92}" type="datetimeFigureOut">
               <a:rPr lang="en-US" smtClean="0"/>
-              <a:t>11/4/20</a:t>
+              <a:t>1/25/21</a:t>
             </a:fld>
             <a:endParaRPr lang="en-US"/>
           </a:p>
@@ -562,6 +565,90 @@
     <p:extLst>
       <p:ext uri="{BB962C8B-B14F-4D97-AF65-F5344CB8AC3E}">
         <p14:creationId xmlns:p14="http://schemas.microsoft.com/office/powerpoint/2010/main" val="7012149"/>
+      </p:ext>
+    </p:extLst>
+  </p:cSld>
+  <p:clrMapOvr>
+    <a:masterClrMapping/>
+  </p:clrMapOvr>
+</p:notes>
+</file>
+
+<file path=ppt/notesSlides/notesSlide2.xml><?xml version="1.0" encoding="utf-8"?>
+<p:notes xmlns:a="http://schemas.openxmlformats.org/drawingml/2006/main" xmlns:r="http://schemas.openxmlformats.org/officeDocument/2006/relationships" xmlns:p="http://schemas.openxmlformats.org/presentationml/2006/main">
+  <p:cSld>
+    <p:spTree>
+      <p:nvGrpSpPr>
+        <p:cNvPr id="1" name=""/>
+        <p:cNvGrpSpPr/>
+        <p:nvPr/>
+      </p:nvGrpSpPr>
+      <p:grpSpPr>
+        <a:xfrm>
+          <a:off x="0" y="0"/>
+          <a:ext cx="0" cy="0"/>
+          <a:chOff x="0" y="0"/>
+          <a:chExt cx="0" cy="0"/>
+        </a:xfrm>
+      </p:grpSpPr>
+      <p:sp>
+        <p:nvSpPr>
+          <p:cNvPr id="2" name="Platshållare för bildobjekt 1"/>
+          <p:cNvSpPr>
+            <a:spLocks noGrp="1" noRot="1" noChangeAspect="1"/>
+          </p:cNvSpPr>
+          <p:nvPr>
+            <p:ph type="sldImg"/>
+          </p:nvPr>
+        </p:nvSpPr>
+        <p:spPr/>
+      </p:sp>
+      <p:sp>
+        <p:nvSpPr>
+          <p:cNvPr id="3" name="Platshållare för anteckningar 2"/>
+          <p:cNvSpPr>
+            <a:spLocks noGrp="1"/>
+          </p:cNvSpPr>
+          <p:nvPr>
+            <p:ph type="body" idx="1"/>
+          </p:nvPr>
+        </p:nvSpPr>
+        <p:spPr/>
+        <p:txBody>
+          <a:bodyPr/>
+          <a:lstStyle/>
+          <a:p>
+            <a:endParaRPr lang="en-GB" dirty="0"/>
+          </a:p>
+        </p:txBody>
+      </p:sp>
+      <p:sp>
+        <p:nvSpPr>
+          <p:cNvPr id="4" name="Platshållare för bildnummer 3"/>
+          <p:cNvSpPr>
+            <a:spLocks noGrp="1"/>
+          </p:cNvSpPr>
+          <p:nvPr>
+            <p:ph type="sldNum" sz="quarter" idx="5"/>
+          </p:nvPr>
+        </p:nvSpPr>
+        <p:spPr/>
+        <p:txBody>
+          <a:bodyPr/>
+          <a:lstStyle/>
+          <a:p>
+            <a:fld id="{93028652-11D1-8A42-9F26-9AC760C0492B}" type="slidenum">
+              <a:rPr lang="en-US" smtClean="0"/>
+              <a:t>6</a:t>
+            </a:fld>
+            <a:endParaRPr lang="en-US"/>
+          </a:p>
+        </p:txBody>
+      </p:sp>
+    </p:spTree>
+    <p:extLst>
+      <p:ext uri="{BB962C8B-B14F-4D97-AF65-F5344CB8AC3E}">
+        <p14:creationId xmlns:p14="http://schemas.microsoft.com/office/powerpoint/2010/main" val="3566442225"/>
       </p:ext>
     </p:extLst>
   </p:cSld>
@@ -11013,6 +11100,317 @@
           <p:cNvPr id="4" name="Rubrik 3">
             <a:extLst>
               <a:ext uri="{FF2B5EF4-FFF2-40B4-BE49-F238E27FC236}">
+                <a16:creationId xmlns:a16="http://schemas.microsoft.com/office/drawing/2014/main" id="{EB394D22-9253-3F41-8B15-27DF58FD2FEB}"/>
+              </a:ext>
+            </a:extLst>
+          </p:cNvPr>
+          <p:cNvSpPr>
+            <a:spLocks noGrp="1"/>
+          </p:cNvSpPr>
+          <p:nvPr>
+            <p:ph type="title"/>
+          </p:nvPr>
+        </p:nvSpPr>
+        <p:spPr>
+          <a:xfrm>
+            <a:off x="712321" y="331661"/>
+            <a:ext cx="4630723" cy="1216403"/>
+          </a:xfrm>
+        </p:spPr>
+        <p:txBody>
+          <a:bodyPr/>
+          <a:lstStyle/>
+          <a:p>
+            <a:pPr algn="l"/>
+            <a:r>
+              <a:rPr lang="en-GB" sz="4400" dirty="0" err="1"/>
+              <a:t>FastQ</a:t>
+            </a:r>
+            <a:r>
+              <a:rPr lang="en-GB" sz="4400" dirty="0"/>
+              <a:t> files</a:t>
+            </a:r>
+          </a:p>
+        </p:txBody>
+      </p:sp>
+      <p:sp useBgFill="1">
+        <p:nvSpPr>
+          <p:cNvPr id="7" name="Content Placeholder 2">
+            <a:extLst>
+              <a:ext uri="{FF2B5EF4-FFF2-40B4-BE49-F238E27FC236}">
+                <a16:creationId xmlns:a16="http://schemas.microsoft.com/office/drawing/2014/main" id="{FCBB8B80-0AE1-8740-9E86-7BD228737C9E}"/>
+              </a:ext>
+            </a:extLst>
+          </p:cNvPr>
+          <p:cNvSpPr>
+            <a:spLocks noGrp="1"/>
+          </p:cNvSpPr>
+          <p:nvPr>
+            <p:ph idx="1"/>
+          </p:nvPr>
+        </p:nvSpPr>
+        <p:spPr>
+          <a:xfrm>
+            <a:off x="712321" y="1834090"/>
+            <a:ext cx="7678080" cy="4233898"/>
+          </a:xfrm>
+        </p:spPr>
+        <p:txBody>
+          <a:bodyPr>
+            <a:normAutofit fontScale="92500" lnSpcReduction="10000"/>
+          </a:bodyPr>
+          <a:lstStyle/>
+          <a:p>
+            <a:pPr marL="0" indent="0">
+              <a:spcBef>
+                <a:spcPts val="0"/>
+              </a:spcBef>
+              <a:buNone/>
+            </a:pPr>
+            <a:endParaRPr lang="en-GB" sz="1905" dirty="0">
+              <a:solidFill>
+                <a:srgbClr val="FF0000"/>
+              </a:solidFill>
+              <a:latin typeface="Courier New"/>
+              <a:cs typeface="Courier New"/>
+            </a:endParaRPr>
+          </a:p>
+          <a:p>
+            <a:pPr marL="0" indent="0">
+              <a:spcBef>
+                <a:spcPts val="0"/>
+              </a:spcBef>
+              <a:buNone/>
+            </a:pPr>
+            <a:r>
+              <a:rPr lang="en-GB" sz="1905" dirty="0">
+                <a:solidFill>
+                  <a:srgbClr val="FF0000"/>
+                </a:solidFill>
+                <a:latin typeface="Courier New"/>
+                <a:cs typeface="Courier New"/>
+              </a:rPr>
+              <a:t>@HWUSI-EAS100R:6:73:941:1973#0/1</a:t>
+            </a:r>
+          </a:p>
+          <a:p>
+            <a:pPr marL="0" indent="0">
+              <a:spcBef>
+                <a:spcPts val="0"/>
+              </a:spcBef>
+              <a:buNone/>
+            </a:pPr>
+            <a:r>
+              <a:rPr lang="en-GB" sz="1905" dirty="0">
+                <a:solidFill>
+                  <a:srgbClr val="FF0000"/>
+                </a:solidFill>
+                <a:latin typeface="Courier New"/>
+                <a:cs typeface="Courier New"/>
+              </a:rPr>
+              <a:t>GATTTGGGGTTCAAAGCAGTATCGATCAAATAGTAAATCCATTTGTTCAACTCACAGTTT</a:t>
+            </a:r>
+          </a:p>
+          <a:p>
+            <a:pPr marL="0" indent="0">
+              <a:spcBef>
+                <a:spcPts val="0"/>
+              </a:spcBef>
+              <a:buNone/>
+            </a:pPr>
+            <a:r>
+              <a:rPr lang="en-GB" sz="1905" dirty="0">
+                <a:solidFill>
+                  <a:srgbClr val="FF0000"/>
+                </a:solidFill>
+                <a:latin typeface="Courier New"/>
+                <a:cs typeface="Courier New"/>
+              </a:rPr>
+              <a:t>+</a:t>
+            </a:r>
+          </a:p>
+          <a:p>
+            <a:pPr marL="0" indent="0">
+              <a:spcBef>
+                <a:spcPts val="0"/>
+              </a:spcBef>
+              <a:buNone/>
+            </a:pPr>
+            <a:r>
+              <a:rPr lang="en-GB" sz="1905" dirty="0">
+                <a:solidFill>
+                  <a:srgbClr val="FF0000"/>
+                </a:solidFill>
+                <a:latin typeface="Courier New"/>
+                <a:cs typeface="Courier New"/>
+              </a:rPr>
+              <a:t>!''*((((***+))%%%++)(%%%%).1***-+*''))**55CCF&gt;&gt;&gt;&gt;&gt;&gt;CCCCCCC65</a:t>
+            </a:r>
+          </a:p>
+          <a:p>
+            <a:pPr marL="0" indent="0">
+              <a:spcBef>
+                <a:spcPts val="0"/>
+              </a:spcBef>
+              <a:spcAft>
+                <a:spcPts val="544"/>
+              </a:spcAft>
+              <a:buNone/>
+            </a:pPr>
+            <a:endParaRPr lang="en-GB" sz="1905" dirty="0">
+              <a:latin typeface="Courier New"/>
+              <a:cs typeface="Courier New"/>
+            </a:endParaRPr>
+          </a:p>
+          <a:p>
+            <a:pPr marL="65298" indent="0">
+              <a:spcBef>
+                <a:spcPts val="454"/>
+              </a:spcBef>
+              <a:spcAft>
+                <a:spcPts val="544"/>
+              </a:spcAft>
+              <a:buNone/>
+            </a:pPr>
+            <a:r>
+              <a:rPr lang="en-GB" sz="1905" dirty="0"/>
+              <a:t>1</a:t>
+            </a:r>
+            <a:r>
+              <a:rPr lang="en-GB" sz="1905" baseline="30000" dirty="0"/>
+              <a:t>st</a:t>
+            </a:r>
+            <a:r>
+              <a:rPr lang="en-GB" sz="1905" dirty="0"/>
+              <a:t> row: sequence identifier (machine ID, x-y coordinates, additional info)</a:t>
+            </a:r>
+          </a:p>
+          <a:p>
+            <a:pPr marL="65298" indent="0">
+              <a:spcBef>
+                <a:spcPts val="454"/>
+              </a:spcBef>
+              <a:spcAft>
+                <a:spcPts val="544"/>
+              </a:spcAft>
+              <a:buNone/>
+            </a:pPr>
+            <a:r>
+              <a:rPr lang="en-GB" sz="1905" dirty="0"/>
+              <a:t>2</a:t>
+            </a:r>
+            <a:r>
+              <a:rPr lang="en-GB" sz="1905" baseline="30000" dirty="0"/>
+              <a:t>nd</a:t>
+            </a:r>
+            <a:r>
+              <a:rPr lang="en-GB" sz="1905" dirty="0"/>
+              <a:t> row: The actual sequence</a:t>
+            </a:r>
+          </a:p>
+          <a:p>
+            <a:pPr marL="65298" indent="0">
+              <a:spcBef>
+                <a:spcPts val="454"/>
+              </a:spcBef>
+              <a:spcAft>
+                <a:spcPts val="544"/>
+              </a:spcAft>
+              <a:buNone/>
+            </a:pPr>
+            <a:r>
+              <a:rPr lang="en-GB" sz="1905" dirty="0"/>
+              <a:t>3</a:t>
+            </a:r>
+            <a:r>
+              <a:rPr lang="en-GB" sz="1905" baseline="30000" dirty="0"/>
+              <a:t>rd</a:t>
+            </a:r>
+            <a:r>
+              <a:rPr lang="en-GB" sz="1905" dirty="0"/>
+              <a:t> row: starts with “+” and optionally the same identifier as in the 1</a:t>
+            </a:r>
+            <a:r>
+              <a:rPr lang="en-GB" sz="1905" baseline="30000" dirty="0"/>
+              <a:t>st</a:t>
+            </a:r>
+            <a:r>
+              <a:rPr lang="en-GB" sz="1905" dirty="0"/>
+              <a:t> row</a:t>
+            </a:r>
+          </a:p>
+          <a:p>
+            <a:pPr marL="65298" indent="0">
+              <a:spcBef>
+                <a:spcPts val="454"/>
+              </a:spcBef>
+              <a:spcAft>
+                <a:spcPts val="544"/>
+              </a:spcAft>
+              <a:buNone/>
+            </a:pPr>
+            <a:r>
+              <a:rPr lang="en-GB" sz="1905" dirty="0"/>
+              <a:t>4</a:t>
+            </a:r>
+            <a:r>
+              <a:rPr lang="en-GB" sz="1905" baseline="30000" dirty="0"/>
+              <a:t>th</a:t>
+            </a:r>
+            <a:r>
+              <a:rPr lang="en-GB" sz="1905" dirty="0"/>
+              <a:t> row: Quality score for each base in read	</a:t>
+            </a:r>
+          </a:p>
+          <a:p>
+            <a:pPr marL="65298" indent="0">
+              <a:buNone/>
+            </a:pPr>
+            <a:endParaRPr lang="en-GB" sz="1905" dirty="0"/>
+          </a:p>
+          <a:p>
+            <a:pPr marL="65298" indent="0">
+              <a:buNone/>
+            </a:pPr>
+            <a:endParaRPr lang="en-GB" sz="1633" dirty="0"/>
+          </a:p>
+        </p:txBody>
+      </p:sp>
+    </p:spTree>
+    <p:extLst>
+      <p:ext uri="{BB962C8B-B14F-4D97-AF65-F5344CB8AC3E}">
+        <p14:creationId xmlns:p14="http://schemas.microsoft.com/office/powerpoint/2010/main" val="447054540"/>
+      </p:ext>
+    </p:extLst>
+  </p:cSld>
+  <p:clrMapOvr>
+    <a:masterClrMapping/>
+  </p:clrMapOvr>
+</p:sld>
+</file>
+
+<file path=ppt/slides/slide3.xml><?xml version="1.0" encoding="utf-8"?>
+<p:sld xmlns:a="http://schemas.openxmlformats.org/drawingml/2006/main" xmlns:r="http://schemas.openxmlformats.org/officeDocument/2006/relationships" xmlns:p="http://schemas.openxmlformats.org/presentationml/2006/main" showMasterSp="0">
+  <p:cSld>
+    <p:spTree>
+      <p:nvGrpSpPr>
+        <p:cNvPr id="1" name=""/>
+        <p:cNvGrpSpPr/>
+        <p:nvPr/>
+      </p:nvGrpSpPr>
+      <p:grpSpPr>
+        <a:xfrm>
+          <a:off x="0" y="0"/>
+          <a:ext cx="0" cy="0"/>
+          <a:chOff x="0" y="0"/>
+          <a:chExt cx="0" cy="0"/>
+        </a:xfrm>
+      </p:grpSpPr>
+      <p:sp>
+        <p:nvSpPr>
+          <p:cNvPr id="4" name="Rubrik 3">
+            <a:extLst>
+              <a:ext uri="{FF2B5EF4-FFF2-40B4-BE49-F238E27FC236}">
                 <a16:creationId xmlns:a16="http://schemas.microsoft.com/office/drawing/2014/main" id="{FD310C9F-32E7-9443-8771-42434C455E6C}"/>
               </a:ext>
             </a:extLst>
@@ -11097,116 +11495,6 @@
     <p:extLst>
       <p:ext uri="{BB962C8B-B14F-4D97-AF65-F5344CB8AC3E}">
         <p14:creationId xmlns:p14="http://schemas.microsoft.com/office/powerpoint/2010/main" val="2645692890"/>
-      </p:ext>
-    </p:extLst>
-  </p:cSld>
-  <p:clrMapOvr>
-    <a:masterClrMapping/>
-  </p:clrMapOvr>
-</p:sld>
-</file>
-
-<file path=ppt/slides/slide3.xml><?xml version="1.0" encoding="utf-8"?>
-<p:sld xmlns:a="http://schemas.openxmlformats.org/drawingml/2006/main" xmlns:r="http://schemas.openxmlformats.org/officeDocument/2006/relationships" xmlns:p="http://schemas.openxmlformats.org/presentationml/2006/main" showMasterSp="0">
-  <p:cSld>
-    <p:spTree>
-      <p:nvGrpSpPr>
-        <p:cNvPr id="1" name=""/>
-        <p:cNvGrpSpPr/>
-        <p:nvPr/>
-      </p:nvGrpSpPr>
-      <p:grpSpPr>
-        <a:xfrm>
-          <a:off x="0" y="0"/>
-          <a:ext cx="0" cy="0"/>
-          <a:chOff x="0" y="0"/>
-          <a:chExt cx="0" cy="0"/>
-        </a:xfrm>
-      </p:grpSpPr>
-      <p:sp useBgFill="1">
-        <p:nvSpPr>
-          <p:cNvPr id="4" name="Rubrik 3">
-            <a:extLst>
-              <a:ext uri="{FF2B5EF4-FFF2-40B4-BE49-F238E27FC236}">
-                <a16:creationId xmlns:a16="http://schemas.microsoft.com/office/drawing/2014/main" id="{C956CA21-D2D9-C946-B7C9-49A3E31CA540}"/>
-              </a:ext>
-            </a:extLst>
-          </p:cNvPr>
-          <p:cNvSpPr>
-            <a:spLocks noGrp="1"/>
-          </p:cNvSpPr>
-          <p:nvPr>
-            <p:ph type="title"/>
-          </p:nvPr>
-        </p:nvSpPr>
-        <p:spPr>
-          <a:xfrm>
-            <a:off x="251138" y="318782"/>
-            <a:ext cx="8641723" cy="1216403"/>
-          </a:xfrm>
-        </p:spPr>
-        <p:txBody>
-          <a:bodyPr/>
-          <a:lstStyle/>
-          <a:p>
-            <a:r>
-              <a:rPr lang="en-GB" sz="4400" dirty="0"/>
-              <a:t>ASCII encoded quality scores</a:t>
-            </a:r>
-          </a:p>
-        </p:txBody>
-      </p:sp>
-      <p:pic>
-        <p:nvPicPr>
-          <p:cNvPr id="2050" name="Picture 2" descr="Bioinformatics for Beginners - File Formats Part 2. - Short reads | Omixon  | NGS for HLA">
-            <a:extLst>
-              <a:ext uri="{FF2B5EF4-FFF2-40B4-BE49-F238E27FC236}">
-                <a16:creationId xmlns:a16="http://schemas.microsoft.com/office/drawing/2014/main" id="{3D77B8FD-AD88-374E-AD19-435FC4819767}"/>
-              </a:ext>
-            </a:extLst>
-          </p:cNvPr>
-          <p:cNvPicPr>
-            <a:picLocks noChangeAspect="1" noChangeArrowheads="1"/>
-          </p:cNvPicPr>
-          <p:nvPr/>
-        </p:nvPicPr>
-        <p:blipFill>
-          <a:blip r:embed="rId2">
-            <a:extLst>
-              <a:ext uri="{28A0092B-C50C-407E-A947-70E740481C1C}">
-                <a14:useLocalDpi xmlns:a14="http://schemas.microsoft.com/office/drawing/2010/main" val="0"/>
-              </a:ext>
-            </a:extLst>
-          </a:blip>
-          <a:srcRect/>
-          <a:stretch>
-            <a:fillRect/>
-          </a:stretch>
-        </p:blipFill>
-        <p:spPr bwMode="auto">
-          <a:xfrm>
-            <a:off x="776449" y="1535185"/>
-            <a:ext cx="7874438" cy="5323564"/>
-          </a:xfrm>
-          <a:prstGeom prst="rect">
-            <a:avLst/>
-          </a:prstGeom>
-          <a:noFill/>
-          <a:extLst>
-            <a:ext uri="{909E8E84-426E-40DD-AFC4-6F175D3DCCD1}">
-              <a14:hiddenFill xmlns:a14="http://schemas.microsoft.com/office/drawing/2010/main">
-                <a:solidFill>
-                  <a:srgbClr val="FFFFFF"/>
-                </a:solidFill>
-              </a14:hiddenFill>
-            </a:ext>
-          </a:extLst>
-        </p:spPr>
-      </p:pic>
-    </p:spTree>
-    <p:extLst>
-      <p:ext uri="{BB962C8B-B14F-4D97-AF65-F5344CB8AC3E}">
-        <p14:creationId xmlns:p14="http://schemas.microsoft.com/office/powerpoint/2010/main" val="1065868198"/>
       </p:ext>
     </p:extLst>
   </p:cSld>
@@ -11419,6 +11707,360 @@
     <p:extLst>
       <p:ext uri="{BB962C8B-B14F-4D97-AF65-F5344CB8AC3E}">
         <p14:creationId xmlns:p14="http://schemas.microsoft.com/office/powerpoint/2010/main" val="75370618"/>
+      </p:ext>
+    </p:extLst>
+  </p:cSld>
+  <p:clrMapOvr>
+    <a:masterClrMapping/>
+  </p:clrMapOvr>
+</p:sld>
+</file>
+
+<file path=ppt/slides/slide5.xml><?xml version="1.0" encoding="utf-8"?>
+<p:sld xmlns:a="http://schemas.openxmlformats.org/drawingml/2006/main" xmlns:r="http://schemas.openxmlformats.org/officeDocument/2006/relationships" xmlns:p="http://schemas.openxmlformats.org/presentationml/2006/main" showMasterSp="0">
+  <p:cSld>
+    <p:spTree>
+      <p:nvGrpSpPr>
+        <p:cNvPr id="1" name=""/>
+        <p:cNvGrpSpPr/>
+        <p:nvPr/>
+      </p:nvGrpSpPr>
+      <p:grpSpPr>
+        <a:xfrm>
+          <a:off x="0" y="0"/>
+          <a:ext cx="0" cy="0"/>
+          <a:chOff x="0" y="0"/>
+          <a:chExt cx="0" cy="0"/>
+        </a:xfrm>
+      </p:grpSpPr>
+      <p:sp>
+        <p:nvSpPr>
+          <p:cNvPr id="2" name="Platshållare för innehåll 1">
+            <a:extLst>
+              <a:ext uri="{FF2B5EF4-FFF2-40B4-BE49-F238E27FC236}">
+                <a16:creationId xmlns:a16="http://schemas.microsoft.com/office/drawing/2014/main" id="{430E294F-DB09-1F4D-B3BE-83E39C8ED5D9}"/>
+              </a:ext>
+            </a:extLst>
+          </p:cNvPr>
+          <p:cNvSpPr>
+            <a:spLocks noGrp="1"/>
+          </p:cNvSpPr>
+          <p:nvPr>
+            <p:ph idx="1"/>
+          </p:nvPr>
+        </p:nvSpPr>
+        <p:spPr>
+          <a:xfrm>
+            <a:off x="252000" y="2375290"/>
+            <a:ext cx="8640000" cy="4629229"/>
+          </a:xfrm>
+        </p:spPr>
+        <p:txBody>
+          <a:bodyPr/>
+          <a:lstStyle/>
+          <a:p>
+            <a:r>
+              <a:rPr lang="en-GB" dirty="0"/>
+              <a:t>Different NGS application have their own problem areas and requires their own QC strategy</a:t>
+            </a:r>
+          </a:p>
+          <a:p>
+            <a:endParaRPr lang="en-GB" dirty="0"/>
+          </a:p>
+          <a:p>
+            <a:r>
+              <a:rPr lang="en-GB" dirty="0"/>
+              <a:t>Today: Focus on QC for whole genome sequencing</a:t>
+            </a:r>
+          </a:p>
+          <a:p>
+            <a:endParaRPr lang="en-GB" dirty="0"/>
+          </a:p>
+          <a:p>
+            <a:r>
+              <a:rPr lang="en-GB" dirty="0"/>
+              <a:t>For variant calling it is important to look at quality score distribution, sequence length distribution and duplication levels. </a:t>
+            </a:r>
+          </a:p>
+          <a:p>
+            <a:endParaRPr lang="en-GB" dirty="0"/>
+          </a:p>
+          <a:p>
+            <a:r>
+              <a:rPr lang="en-GB" dirty="0"/>
+              <a:t>Thursday: More details on QC for RNA-</a:t>
+            </a:r>
+            <a:r>
+              <a:rPr lang="en-GB" dirty="0" err="1"/>
+              <a:t>seq</a:t>
+            </a:r>
+            <a:endParaRPr lang="en-GB" dirty="0"/>
+          </a:p>
+        </p:txBody>
+      </p:sp>
+      <p:sp>
+        <p:nvSpPr>
+          <p:cNvPr id="3" name="Rubrik 2">
+            <a:extLst>
+              <a:ext uri="{FF2B5EF4-FFF2-40B4-BE49-F238E27FC236}">
+                <a16:creationId xmlns:a16="http://schemas.microsoft.com/office/drawing/2014/main" id="{81E13092-DB5F-D54C-8A7F-44FD171F34AA}"/>
+              </a:ext>
+            </a:extLst>
+          </p:cNvPr>
+          <p:cNvSpPr>
+            <a:spLocks noGrp="1"/>
+          </p:cNvSpPr>
+          <p:nvPr>
+            <p:ph type="title"/>
+          </p:nvPr>
+        </p:nvSpPr>
+        <p:spPr>
+          <a:xfrm>
+            <a:off x="252000" y="630000"/>
+            <a:ext cx="7385172" cy="745200"/>
+          </a:xfrm>
+        </p:spPr>
+        <p:txBody>
+          <a:bodyPr/>
+          <a:lstStyle/>
+          <a:p>
+            <a:r>
+              <a:rPr lang="en-GB" dirty="0"/>
+              <a:t>What is QC?</a:t>
+            </a:r>
+          </a:p>
+        </p:txBody>
+      </p:sp>
+    </p:spTree>
+    <p:extLst>
+      <p:ext uri="{BB962C8B-B14F-4D97-AF65-F5344CB8AC3E}">
+        <p14:creationId xmlns:p14="http://schemas.microsoft.com/office/powerpoint/2010/main" val="827962334"/>
+      </p:ext>
+    </p:extLst>
+  </p:cSld>
+  <p:clrMapOvr>
+    <a:masterClrMapping/>
+  </p:clrMapOvr>
+</p:sld>
+</file>
+
+<file path=ppt/slides/slide6.xml><?xml version="1.0" encoding="utf-8"?>
+<p:sld xmlns:a="http://schemas.openxmlformats.org/drawingml/2006/main" xmlns:r="http://schemas.openxmlformats.org/officeDocument/2006/relationships" xmlns:p="http://schemas.openxmlformats.org/presentationml/2006/main" showMasterSp="0">
+  <p:cSld>
+    <p:spTree>
+      <p:nvGrpSpPr>
+        <p:cNvPr id="1" name=""/>
+        <p:cNvGrpSpPr/>
+        <p:nvPr/>
+      </p:nvGrpSpPr>
+      <p:grpSpPr>
+        <a:xfrm>
+          <a:off x="0" y="0"/>
+          <a:ext cx="0" cy="0"/>
+          <a:chOff x="0" y="0"/>
+          <a:chExt cx="0" cy="0"/>
+        </a:xfrm>
+      </p:grpSpPr>
+      <p:sp>
+        <p:nvSpPr>
+          <p:cNvPr id="4" name="Rubrik 3">
+            <a:extLst>
+              <a:ext uri="{FF2B5EF4-FFF2-40B4-BE49-F238E27FC236}">
+                <a16:creationId xmlns:a16="http://schemas.microsoft.com/office/drawing/2014/main" id="{5F8862CF-3A7C-A745-A0B1-544F5B7CD8C9}"/>
+              </a:ext>
+            </a:extLst>
+          </p:cNvPr>
+          <p:cNvSpPr>
+            <a:spLocks noGrp="1"/>
+          </p:cNvSpPr>
+          <p:nvPr>
+            <p:ph type="title"/>
+          </p:nvPr>
+        </p:nvSpPr>
+        <p:spPr>
+          <a:xfrm>
+            <a:off x="466300" y="280145"/>
+            <a:ext cx="4630723" cy="1216403"/>
+          </a:xfrm>
+        </p:spPr>
+        <p:txBody>
+          <a:bodyPr/>
+          <a:lstStyle/>
+          <a:p>
+            <a:pPr algn="l"/>
+            <a:r>
+              <a:rPr lang="en-GB" sz="4400" dirty="0" err="1"/>
+              <a:t>FastQC</a:t>
+            </a:r>
+            <a:endParaRPr lang="en-GB" sz="4400" dirty="0"/>
+          </a:p>
+        </p:txBody>
+      </p:sp>
+      <p:pic>
+        <p:nvPicPr>
+          <p:cNvPr id="1026" name="Picture 2">
+            <a:extLst>
+              <a:ext uri="{FF2B5EF4-FFF2-40B4-BE49-F238E27FC236}">
+                <a16:creationId xmlns:a16="http://schemas.microsoft.com/office/drawing/2014/main" id="{168F0FCB-283B-E84E-AD6F-D552C43B992B}"/>
+              </a:ext>
+            </a:extLst>
+          </p:cNvPr>
+          <p:cNvPicPr>
+            <a:picLocks noGrp="1" noChangeAspect="1" noChangeArrowheads="1"/>
+          </p:cNvPicPr>
+          <p:nvPr>
+            <p:ph idx="1"/>
+          </p:nvPr>
+        </p:nvPicPr>
+        <p:blipFill>
+          <a:blip r:embed="rId3">
+            <a:extLst>
+              <a:ext uri="{28A0092B-C50C-407E-A947-70E740481C1C}">
+                <a14:useLocalDpi xmlns:a14="http://schemas.microsoft.com/office/drawing/2010/main" val="0"/>
+              </a:ext>
+            </a:extLst>
+          </a:blip>
+          <a:srcRect/>
+          <a:stretch>
+            <a:fillRect/>
+          </a:stretch>
+        </p:blipFill>
+        <p:spPr bwMode="auto">
+          <a:xfrm>
+            <a:off x="762514" y="1340566"/>
+            <a:ext cx="6744574" cy="4629150"/>
+          </a:xfrm>
+          <a:prstGeom prst="rect">
+            <a:avLst/>
+          </a:prstGeom>
+          <a:noFill/>
+          <a:extLst>
+            <a:ext uri="{909E8E84-426E-40DD-AFC4-6F175D3DCCD1}">
+              <a14:hiddenFill xmlns:a14="http://schemas.microsoft.com/office/drawing/2010/main">
+                <a:solidFill>
+                  <a:srgbClr val="FFFFFF"/>
+                </a:solidFill>
+              </a14:hiddenFill>
+            </a:ext>
+          </a:extLst>
+        </p:spPr>
+      </p:pic>
+    </p:spTree>
+    <p:extLst>
+      <p:ext uri="{BB962C8B-B14F-4D97-AF65-F5344CB8AC3E}">
+        <p14:creationId xmlns:p14="http://schemas.microsoft.com/office/powerpoint/2010/main" val="2788067870"/>
+      </p:ext>
+    </p:extLst>
+  </p:cSld>
+  <p:clrMapOvr>
+    <a:masterClrMapping/>
+  </p:clrMapOvr>
+</p:sld>
+</file>
+
+<file path=ppt/slides/slide7.xml><?xml version="1.0" encoding="utf-8"?>
+<p:sld xmlns:a="http://schemas.openxmlformats.org/drawingml/2006/main" xmlns:r="http://schemas.openxmlformats.org/officeDocument/2006/relationships" xmlns:p="http://schemas.openxmlformats.org/presentationml/2006/main" showMasterSp="0">
+  <p:cSld>
+    <p:spTree>
+      <p:nvGrpSpPr>
+        <p:cNvPr id="1" name=""/>
+        <p:cNvGrpSpPr/>
+        <p:nvPr/>
+      </p:nvGrpSpPr>
+      <p:grpSpPr>
+        <a:xfrm>
+          <a:off x="0" y="0"/>
+          <a:ext cx="0" cy="0"/>
+          <a:chOff x="0" y="0"/>
+          <a:chExt cx="0" cy="0"/>
+        </a:xfrm>
+      </p:grpSpPr>
+      <p:sp>
+        <p:nvSpPr>
+          <p:cNvPr id="5" name="Rektangel 4">
+            <a:extLst>
+              <a:ext uri="{FF2B5EF4-FFF2-40B4-BE49-F238E27FC236}">
+                <a16:creationId xmlns:a16="http://schemas.microsoft.com/office/drawing/2014/main" id="{2AC894AB-F610-E649-8189-8D5664F3F19D}"/>
+              </a:ext>
+            </a:extLst>
+          </p:cNvPr>
+          <p:cNvSpPr/>
+          <p:nvPr/>
+        </p:nvSpPr>
+        <p:spPr>
+          <a:xfrm>
+            <a:off x="1275007" y="3244334"/>
+            <a:ext cx="7418231" cy="369332"/>
+          </a:xfrm>
+          <a:prstGeom prst="rect">
+            <a:avLst/>
+          </a:prstGeom>
+        </p:spPr>
+        <p:txBody>
+          <a:bodyPr wrap="square">
+            <a:spAutoFit/>
+          </a:bodyPr>
+          <a:lstStyle/>
+          <a:p>
+            <a:r>
+              <a:rPr lang="en-GB" dirty="0"/>
+              <a:t>https://</a:t>
+            </a:r>
+            <a:r>
+              <a:rPr lang="en-GB" dirty="0" err="1"/>
+              <a:t>www.bioinformatics.babraham.ac.uk</a:t>
+            </a:r>
+            <a:r>
+              <a:rPr lang="en-GB" dirty="0"/>
+              <a:t>/projects/</a:t>
+            </a:r>
+            <a:r>
+              <a:rPr lang="en-GB" dirty="0" err="1"/>
+              <a:t>fastqc</a:t>
+            </a:r>
+            <a:r>
+              <a:rPr lang="en-GB" dirty="0"/>
+              <a:t>/</a:t>
+            </a:r>
+          </a:p>
+        </p:txBody>
+      </p:sp>
+      <p:sp>
+        <p:nvSpPr>
+          <p:cNvPr id="6" name="textruta 5">
+            <a:extLst>
+              <a:ext uri="{FF2B5EF4-FFF2-40B4-BE49-F238E27FC236}">
+                <a16:creationId xmlns:a16="http://schemas.microsoft.com/office/drawing/2014/main" id="{A9ABAF30-2E5C-1D45-A4AA-3E5940179CBE}"/>
+              </a:ext>
+            </a:extLst>
+          </p:cNvPr>
+          <p:cNvSpPr txBox="1"/>
+          <p:nvPr/>
+        </p:nvSpPr>
+        <p:spPr>
+          <a:xfrm>
+            <a:off x="3477296" y="1197735"/>
+            <a:ext cx="184731" cy="369332"/>
+          </a:xfrm>
+          <a:prstGeom prst="rect">
+            <a:avLst/>
+          </a:prstGeom>
+          <a:noFill/>
+        </p:spPr>
+        <p:txBody>
+          <a:bodyPr wrap="none" rtlCol="0">
+            <a:spAutoFit/>
+          </a:bodyPr>
+          <a:lstStyle/>
+          <a:p>
+            <a:endParaRPr lang="en-GB" dirty="0"/>
+          </a:p>
+        </p:txBody>
+      </p:sp>
+    </p:spTree>
+    <p:extLst>
+      <p:ext uri="{BB962C8B-B14F-4D97-AF65-F5344CB8AC3E}">
+        <p14:creationId xmlns:p14="http://schemas.microsoft.com/office/powerpoint/2010/main" val="3138625622"/>
       </p:ext>
     </p:extLst>
   </p:cSld>

</xml_diff>